<commit_message>
redis slis -> sils + mils(model sim)
</commit_message>
<xml_diff>
--- a/DsDotNet/src/UnitTest/UnitTest.Model/ImportOfficeExample/ppt/T9_Group.pptx
+++ b/DsDotNet/src/UnitTest/UnitTest.Model/ImportOfficeExample/ppt/T9_Group.pptx
@@ -217,7 +217,7 @@
           <a:p>
             <a:fld id="{DD503887-5801-43A0-AEF9-041E8DDC2558}" type="datetimeFigureOut">
               <a:rPr lang="ko-KR" altLang="en-US" smtClean="0"/>
-              <a:t>2024-03-13</a:t>
+              <a:t>2024-07-31</a:t>
             </a:fld>
             <a:endParaRPr lang="ko-KR" altLang="en-US"/>
           </a:p>
@@ -394,7 +394,7 @@
           <a:p>
             <a:fld id="{95336A0E-57B1-4D4C-BD9B-2F72B5943464}" type="datetimeFigureOut">
               <a:rPr lang="ko-KR" altLang="en-US" smtClean="0"/>
-              <a:t>2024-03-13</a:t>
+              <a:t>2024-07-31</a:t>
             </a:fld>
             <a:endParaRPr lang="ko-KR" altLang="en-US"/>
           </a:p>
@@ -756,7 +756,7 @@
           <a:effectLst/>
           <a:extLst>
             <a:ext uri="{91240B29-F687-4f45-9708-019B960494DF}">
-              <a14:hiddenLine xmlns="" xmlns:a14="http://schemas.microsoft.com/office/drawing/2010/main" w="9525">
+              <a14:hiddenLine xmlns:a14="http://schemas.microsoft.com/office/drawing/2010/main" xmlns="" w="9525">
                 <a:solidFill>
                   <a:srgbClr val="000000"/>
                 </a:solidFill>
@@ -948,7 +948,7 @@
           <a:p>
             <a:fld id="{DEA6EBF0-8E22-42A7-9BEA-2AC7066E6498}" type="datetimeFigureOut">
               <a:rPr lang="ko-KR" altLang="en-US" smtClean="0"/>
-              <a:t>2024-03-13</a:t>
+              <a:t>2024-07-31</a:t>
             </a:fld>
             <a:endParaRPr lang="ko-KR" altLang="en-US"/>
           </a:p>
@@ -1266,7 +1266,7 @@
           <a:p>
             <a:fld id="{DEA6EBF0-8E22-42A7-9BEA-2AC7066E6498}" type="datetimeFigureOut">
               <a:rPr lang="ko-KR" altLang="en-US" smtClean="0"/>
-              <a:t>2024-03-13</a:t>
+              <a:t>2024-07-31</a:t>
             </a:fld>
             <a:endParaRPr lang="ko-KR" altLang="en-US"/>
           </a:p>
@@ -1754,7 +1754,7 @@
           <a:p>
             <a:fld id="{DEA6EBF0-8E22-42A7-9BEA-2AC7066E6498}" type="datetimeFigureOut">
               <a:rPr lang="ko-KR" altLang="en-US" smtClean="0"/>
-              <a:t>2024-03-13</a:t>
+              <a:t>2024-07-31</a:t>
             </a:fld>
             <a:endParaRPr lang="ko-KR" altLang="en-US"/>
           </a:p>
@@ -2123,7 +2123,7 @@
           <a:p>
             <a:fld id="{DEA6EBF0-8E22-42A7-9BEA-2AC7066E6498}" type="datetimeFigureOut">
               <a:rPr lang="ko-KR" altLang="en-US" smtClean="0"/>
-              <a:t>2024-03-13</a:t>
+              <a:t>2024-07-31</a:t>
             </a:fld>
             <a:endParaRPr lang="ko-KR" altLang="en-US"/>
           </a:p>
@@ -2278,7 +2278,7 @@
           <a:ln/>
           <a:extLst>
             <a:ext uri="{91240B29-F687-4f45-9708-019B960494DF}">
-              <a14:hiddenLine xmlns="" xmlns:a14="http://schemas.microsoft.com/office/drawing/2010/main" w="9525">
+              <a14:hiddenLine xmlns:a14="http://schemas.microsoft.com/office/drawing/2010/main" xmlns="" w="9525">
                 <a:solidFill>
                   <a:srgbClr val="000000"/>
                 </a:solidFill>
@@ -2396,7 +2396,7 @@
           <a:p>
             <a:fld id="{DEA6EBF0-8E22-42A7-9BEA-2AC7066E6498}" type="datetimeFigureOut">
               <a:rPr lang="ko-KR" altLang="en-US" smtClean="0"/>
-              <a:t>2024-03-13</a:t>
+              <a:t>2024-07-31</a:t>
             </a:fld>
             <a:endParaRPr lang="ko-KR" altLang="en-US"/>
           </a:p>
@@ -2553,7 +2553,7 @@
           <a:ln/>
           <a:extLst>
             <a:ext uri="{91240B29-F687-4f45-9708-019B960494DF}">
-              <a14:hiddenLine xmlns="" xmlns:a14="http://schemas.microsoft.com/office/drawing/2010/main" w="9525">
+              <a14:hiddenLine xmlns:a14="http://schemas.microsoft.com/office/drawing/2010/main" xmlns="" w="9525">
                 <a:solidFill>
                   <a:srgbClr val="000000"/>
                 </a:solidFill>
@@ -2681,7 +2681,7 @@
           <a:p>
             <a:fld id="{DEA6EBF0-8E22-42A7-9BEA-2AC7066E6498}" type="datetimeFigureOut">
               <a:rPr lang="ko-KR" altLang="en-US" smtClean="0"/>
-              <a:t>2024-03-13</a:t>
+              <a:t>2024-07-31</a:t>
             </a:fld>
             <a:endParaRPr lang="ko-KR" altLang="en-US"/>
           </a:p>
@@ -2799,7 +2799,7 @@
           <a:p>
             <a:fld id="{DEA6EBF0-8E22-42A7-9BEA-2AC7066E6498}" type="datetimeFigureOut">
               <a:rPr lang="ko-KR" altLang="en-US" smtClean="0"/>
-              <a:t>2024-03-13</a:t>
+              <a:t>2024-07-31</a:t>
             </a:fld>
             <a:endParaRPr lang="ko-KR" altLang="en-US"/>
           </a:p>
@@ -2954,7 +2954,7 @@
           <a:ln/>
           <a:extLst>
             <a:ext uri="{91240B29-F687-4f45-9708-019B960494DF}">
-              <a14:hiddenLine xmlns="" xmlns:a14="http://schemas.microsoft.com/office/drawing/2010/main" w="9525">
+              <a14:hiddenLine xmlns:a14="http://schemas.microsoft.com/office/drawing/2010/main" xmlns="" w="9525">
                 <a:solidFill>
                   <a:srgbClr val="000000"/>
                 </a:solidFill>
@@ -3082,7 +3082,7 @@
           <a:p>
             <a:fld id="{DEA6EBF0-8E22-42A7-9BEA-2AC7066E6498}" type="datetimeFigureOut">
               <a:rPr lang="ko-KR" altLang="en-US" smtClean="0"/>
-              <a:t>2024-03-13</a:t>
+              <a:t>2024-07-31</a:t>
             </a:fld>
             <a:endParaRPr lang="ko-KR" altLang="en-US"/>
           </a:p>
@@ -3425,7 +3425,7 @@
           <a:p>
             <a:fld id="{DEA6EBF0-8E22-42A7-9BEA-2AC7066E6498}" type="datetimeFigureOut">
               <a:rPr lang="ko-KR" altLang="en-US" smtClean="0"/>
-              <a:t>2024-03-13</a:t>
+              <a:t>2024-07-31</a:t>
             </a:fld>
             <a:endParaRPr lang="ko-KR" altLang="en-US"/>
           </a:p>
@@ -3580,7 +3580,7 @@
           <a:ln/>
           <a:extLst>
             <a:ext uri="{91240B29-F687-4f45-9708-019B960494DF}">
-              <a14:hiddenLine xmlns="" xmlns:a14="http://schemas.microsoft.com/office/drawing/2010/main" w="9525">
+              <a14:hiddenLine xmlns:a14="http://schemas.microsoft.com/office/drawing/2010/main" xmlns="" w="9525">
                 <a:solidFill>
                   <a:srgbClr val="000000"/>
                 </a:solidFill>
@@ -3764,7 +3764,7 @@
           <a:p>
             <a:fld id="{DEA6EBF0-8E22-42A7-9BEA-2AC7066E6498}" type="datetimeFigureOut">
               <a:rPr lang="ko-KR" altLang="en-US" smtClean="0"/>
-              <a:t>2024-03-13</a:t>
+              <a:t>2024-07-31</a:t>
             </a:fld>
             <a:endParaRPr lang="ko-KR" altLang="en-US"/>
           </a:p>
@@ -3919,7 +3919,7 @@
           <a:ln/>
           <a:extLst>
             <a:ext uri="{91240B29-F687-4f45-9708-019B960494DF}">
-              <a14:hiddenLine xmlns="" xmlns:a14="http://schemas.microsoft.com/office/drawing/2010/main" w="9525">
+              <a14:hiddenLine xmlns:a14="http://schemas.microsoft.com/office/drawing/2010/main" xmlns="" w="9525">
                 <a:solidFill>
                   <a:srgbClr val="000000"/>
                 </a:solidFill>
@@ -4241,7 +4241,7 @@
           <a:p>
             <a:fld id="{DEA6EBF0-8E22-42A7-9BEA-2AC7066E6498}" type="datetimeFigureOut">
               <a:rPr lang="ko-KR" altLang="en-US" smtClean="0"/>
-              <a:t>2024-03-13</a:t>
+              <a:t>2024-07-31</a:t>
             </a:fld>
             <a:endParaRPr lang="ko-KR" altLang="en-US"/>
           </a:p>
@@ -4336,7 +4336,7 @@
           <a:p>
             <a:fld id="{DEA6EBF0-8E22-42A7-9BEA-2AC7066E6498}" type="datetimeFigureOut">
               <a:rPr lang="ko-KR" altLang="en-US" smtClean="0"/>
-              <a:t>2024-03-13</a:t>
+              <a:t>2024-07-31</a:t>
             </a:fld>
             <a:endParaRPr lang="ko-KR" altLang="en-US"/>
           </a:p>
@@ -4604,7 +4604,7 @@
           <a:ln/>
           <a:extLst>
             <a:ext uri="{91240B29-F687-4f45-9708-019B960494DF}">
-              <a14:hiddenLine xmlns="" xmlns:a14="http://schemas.microsoft.com/office/drawing/2010/main" w="9525">
+              <a14:hiddenLine xmlns:a14="http://schemas.microsoft.com/office/drawing/2010/main" xmlns="" w="9525">
                 <a:solidFill>
                   <a:srgbClr val="000000"/>
                 </a:solidFill>
@@ -4803,7 +4803,7 @@
           <a:p>
             <a:fld id="{DEA6EBF0-8E22-42A7-9BEA-2AC7066E6498}" type="datetimeFigureOut">
               <a:rPr lang="ko-KR" altLang="en-US" smtClean="0"/>
-              <a:t>2024-03-13</a:t>
+              <a:t>2024-07-31</a:t>
             </a:fld>
             <a:endParaRPr lang="ko-KR" altLang="en-US"/>
           </a:p>
@@ -5116,7 +5116,7 @@
           <a:p>
             <a:fld id="{DEA6EBF0-8E22-42A7-9BEA-2AC7066E6498}" type="datetimeFigureOut">
               <a:rPr lang="ko-KR" altLang="en-US" smtClean="0"/>
-              <a:t>2024-03-13</a:t>
+              <a:t>2024-07-31</a:t>
             </a:fld>
             <a:endParaRPr lang="ko-KR" altLang="en-US"/>
           </a:p>
@@ -5386,7 +5386,7 @@
           <a:p>
             <a:fld id="{DEA6EBF0-8E22-42A7-9BEA-2AC7066E6498}" type="datetimeFigureOut">
               <a:rPr lang="ko-KR" altLang="en-US" smtClean="0"/>
-              <a:t>2024-03-13</a:t>
+              <a:t>2024-07-31</a:t>
             </a:fld>
             <a:endParaRPr lang="ko-KR" altLang="en-US"/>
           </a:p>
@@ -6638,10 +6638,10 @@
       </p:sp>
       <p:grpSp>
         <p:nvGrpSpPr>
-          <p:cNvPr id="14" name="그룹 13">
+          <p:cNvPr id="12" name="그룹 11">
             <a:extLst>
               <a:ext uri="{FF2B5EF4-FFF2-40B4-BE49-F238E27FC236}">
-                <a16:creationId xmlns:a16="http://schemas.microsoft.com/office/drawing/2014/main" id="{4E53E08E-2A75-B991-3B19-8D597AEF3D47}"/>
+                <a16:creationId xmlns:a16="http://schemas.microsoft.com/office/drawing/2014/main" id="{17ED9908-7D1F-251D-D993-238F71F5C95F}"/>
               </a:ext>
             </a:extLst>
           </p:cNvPr>
@@ -7578,10 +7578,10 @@
           <a:p>
             <a:pPr algn="ctr"/>
             <a:r>
-              <a:rPr lang="en-US" altLang="ko-KR" dirty="0"/>
+              <a:rPr lang="en-US" altLang="ko-KR" strike="sngStrike" dirty="0"/>
               <a:t>R2</a:t>
             </a:r>
-            <a:endParaRPr lang="ko-KR" altLang="en-US" dirty="0"/>
+            <a:endParaRPr lang="ko-KR" altLang="en-US" strike="sngStrike" dirty="0"/>
           </a:p>
         </p:txBody>
       </p:sp>

</xml_diff>